<commit_message>
added pthreads without heuristic, edited presentation
</commit_message>
<xml_diff>
--- a/EE 451 Project Presentation Template(1).pptx
+++ b/EE 451 Project Presentation Template(1).pptx
@@ -3048,7 +3048,7 @@
         </p:nvSpPr>
         <p:spPr>
           <a:xfrm>
-            <a:off x="685800" y="2130425"/>
+            <a:off x="685800" y="1371600"/>
             <a:ext cx="7772400" cy="1470025"/>
           </a:xfrm>
           <a:prstGeom prst="rect">
@@ -3096,7 +3096,7 @@
         </p:nvSpPr>
         <p:spPr>
           <a:xfrm>
-            <a:off x="1371600" y="3124200"/>
+            <a:off x="1371600" y="3886200"/>
             <a:ext cx="6400800" cy="2514600"/>
           </a:xfrm>
           <a:prstGeom prst="rect">
@@ -3346,6 +3346,30 @@
           </a:p>
         </p:txBody>
       </p:sp>
+      <p:pic>
+        <p:nvPicPr>
+          <p:cNvPr id="6" name="Picture 5"/>
+          <p:cNvPicPr>
+            <a:picLocks noChangeAspect="1"/>
+          </p:cNvPicPr>
+          <p:nvPr/>
+        </p:nvPicPr>
+        <p:blipFill>
+          <a:blip r:embed="rId2"/>
+          <a:stretch>
+            <a:fillRect/>
+          </a:stretch>
+        </p:blipFill>
+        <p:spPr>
+          <a:xfrm>
+            <a:off x="3695700" y="2286000"/>
+            <a:ext cx="1752600" cy="1752600"/>
+          </a:xfrm>
+          <a:prstGeom prst="rect">
+            <a:avLst/>
+          </a:prstGeom>
+        </p:spPr>
+      </p:pic>
     </p:spTree>
     <p:extLst>
       <p:ext uri="{BB962C8B-B14F-4D97-AF65-F5344CB8AC3E}">
@@ -3556,7 +3580,12 @@
             <p:ph type="title"/>
           </p:nvPr>
         </p:nvSpPr>
-        <p:spPr/>
+        <p:spPr>
+          <a:xfrm>
+            <a:off x="436536" y="0"/>
+            <a:ext cx="8229600" cy="1143000"/>
+          </a:xfrm>
+        </p:spPr>
         <p:txBody>
           <a:bodyPr/>
           <a:lstStyle/>
@@ -3579,16 +3608,29 @@
             <p:ph idx="1"/>
           </p:nvPr>
         </p:nvSpPr>
-        <p:spPr/>
+        <p:spPr>
+          <a:xfrm>
+            <a:off x="441702" y="1113295"/>
+            <a:ext cx="8229600" cy="4648200"/>
+          </a:xfrm>
+        </p:spPr>
         <p:txBody>
           <a:bodyPr>
-            <a:normAutofit lnSpcReduction="10000"/>
+            <a:normAutofit fontScale="85000" lnSpcReduction="20000"/>
           </a:bodyPr>
           <a:lstStyle/>
           <a:p>
             <a:r>
+              <a:rPr lang="en-US" smtClean="0"/>
+              <a:t>Game’s objective is </a:t>
+            </a:r>
+            <a:r>
               <a:rPr lang="en-US" dirty="0" smtClean="0"/>
-              <a:t>The objective of the game is to get to 24 using each number exactly once, through a series of mathematical operations (+ x ÷ –)</a:t>
+              <a:t>to get to 24 using each number exactly once, through a series of mathematical operations (+ x ÷ </a:t>
+            </a:r>
+            <a:r>
+              <a:rPr lang="en-US" dirty="0" smtClean="0"/>
+              <a:t>–)</a:t>
             </a:r>
             <a:endParaRPr lang="en-US" dirty="0"/>
           </a:p>
@@ -3597,8 +3639,25 @@
           </a:p>
           <a:p>
             <a:r>
+              <a:rPr lang="en-US" dirty="0" smtClean="0"/>
+              <a:t>Used for basic arithmetic and </a:t>
+            </a:r>
+            <a:r>
+              <a:rPr lang="en-US" dirty="0" smtClean="0"/>
+              <a:t>to instill pattern recognition</a:t>
+            </a:r>
+          </a:p>
+          <a:p>
+            <a:endParaRPr lang="en-US" dirty="0" smtClean="0"/>
+          </a:p>
+          <a:p>
+            <a:r>
               <a:rPr lang="en-US" dirty="0"/>
-              <a:t>Where is the problem used? Why is it important?</a:t>
+              <a:t>S</a:t>
+            </a:r>
+            <a:r>
+              <a:rPr lang="en-US" dirty="0" smtClean="0"/>
+              <a:t>imple way to illustrate trends of parallelization</a:t>
             </a:r>
           </a:p>
           <a:p>
@@ -3606,36 +3665,13 @@
           </a:p>
           <a:p>
             <a:r>
-              <a:rPr lang="en-US" dirty="0"/>
-              <a:t>Why is parallelization necessary?</a:t>
-            </a:r>
+              <a:rPr lang="en-US" dirty="0" smtClean="0"/>
+              <a:t>Parallelization could be beneficial for a 24 Game solver as there are many possible permutations to try to reach 24</a:t>
+            </a:r>
+            <a:endParaRPr lang="en-US" dirty="0"/>
           </a:p>
         </p:txBody>
       </p:sp>
-      <p:pic>
-        <p:nvPicPr>
-          <p:cNvPr id="4" name="Picture 3"/>
-          <p:cNvPicPr>
-            <a:picLocks noChangeAspect="1"/>
-          </p:cNvPicPr>
-          <p:nvPr/>
-        </p:nvPicPr>
-        <p:blipFill>
-          <a:blip r:embed="rId2"/>
-          <a:stretch>
-            <a:fillRect/>
-          </a:stretch>
-        </p:blipFill>
-        <p:spPr>
-          <a:xfrm>
-            <a:off x="7086600" y="3390900"/>
-            <a:ext cx="1828800" cy="1828800"/>
-          </a:xfrm>
-          <a:prstGeom prst="rect">
-            <a:avLst/>
-          </a:prstGeom>
-        </p:spPr>
-      </p:pic>
     </p:spTree>
     <p:extLst>
       <p:ext uri="{BB962C8B-B14F-4D97-AF65-F5344CB8AC3E}">
@@ -3713,17 +3749,49 @@
               <a:rPr lang="en-US" altLang="zh-CN" sz="3200" dirty="0">
                 <a:ea typeface="宋体" charset="-122"/>
               </a:rPr>
-              <a:t>List the challenges in parallelization </a:t>
-            </a:r>
-          </a:p>
-          <a:p>
+              <a:t>D</a:t>
+            </a:r>
+            <a:r>
+              <a:rPr lang="en-US" altLang="zh-CN" sz="3200" dirty="0" smtClean="0">
+                <a:ea typeface="宋体" charset="-122"/>
+              </a:rPr>
+              <a:t>istribute 24 cards to solve among a number of </a:t>
+            </a:r>
+            <a:r>
+              <a:rPr lang="en-US" altLang="zh-CN" sz="3200" dirty="0" err="1" smtClean="0">
+                <a:ea typeface="宋体" charset="-122"/>
+              </a:rPr>
+              <a:t>Pthreads</a:t>
+            </a:r>
+            <a:endParaRPr lang="en-US" altLang="zh-CN" sz="3200" dirty="0" smtClean="0">
+              <a:ea typeface="宋体" charset="-122"/>
+            </a:endParaRPr>
+          </a:p>
+          <a:p>
+            <a:r>
+              <a:rPr lang="en-US" altLang="zh-CN" sz="3200" dirty="0" smtClean="0">
+                <a:ea typeface="宋体" charset="-122"/>
+              </a:rPr>
+              <a:t>Each card has (4! * 64) = 1536 (in general) different permutations</a:t>
+            </a:r>
+          </a:p>
+          <a:p>
+            <a:r>
+              <a:rPr lang="en-US" altLang="zh-CN" sz="3200" dirty="0" smtClean="0">
+                <a:ea typeface="宋体" charset="-122"/>
+              </a:rPr>
+              <a:t>Challenges in parallelization:</a:t>
+            </a:r>
+          </a:p>
+          <a:p>
+            <a:pPr lvl="1"/>
+            <a:r>
+              <a:rPr lang="en-US" altLang="zh-CN" dirty="0" smtClean="0">
+                <a:ea typeface="宋体" charset="-122"/>
+              </a:rPr>
+              <a:t>Coming up with a heuristic to further the benefits of parallelization</a:t>
+            </a:r>
             <a:endParaRPr lang="en-US" altLang="zh-CN" sz="3200" dirty="0"/>
-          </a:p>
-          <a:p>
-            <a:r>
-              <a:rPr lang="en-US" altLang="zh-CN" sz="3200" dirty="0"/>
-              <a:t>Give some context regarding any existing parallel solutions (Skip If there are no existing solutions)</a:t>
-            </a:r>
           </a:p>
           <a:p>
             <a:endParaRPr lang="en-US" altLang="zh-CN" sz="3200" dirty="0">
@@ -3806,9 +3874,40 @@
           <a:lstStyle/>
           <a:p>
             <a:r>
+              <a:rPr lang="en-US" altLang="zh-CN" sz="3200" dirty="0" smtClean="0"/>
+              <a:t>Parallelization on a brute force 24 Game solver</a:t>
+            </a:r>
+          </a:p>
+          <a:p>
+            <a:endParaRPr lang="en-US" altLang="zh-CN" sz="3200" dirty="0" smtClean="0"/>
+          </a:p>
+          <a:p>
+            <a:r>
               <a:rPr lang="en-US" altLang="zh-CN" sz="3200" dirty="0"/>
-              <a:t>List the objectives/potential contribution of the project</a:t>
-            </a:r>
+              <a:t>I</a:t>
+            </a:r>
+            <a:r>
+              <a:rPr lang="en-US" altLang="zh-CN" sz="3200" dirty="0" smtClean="0"/>
+              <a:t>ntroducing a heuristic to the 24 Game solver</a:t>
+            </a:r>
+          </a:p>
+          <a:p>
+            <a:pPr lvl="1"/>
+            <a:r>
+              <a:rPr lang="en-US" altLang="zh-CN" dirty="0" smtClean="0"/>
+              <a:t>Keep a table with most consistent numbers that lead to a solution</a:t>
+            </a:r>
+          </a:p>
+          <a:p>
+            <a:pPr lvl="1"/>
+            <a:endParaRPr lang="en-US" altLang="zh-CN" dirty="0" smtClean="0"/>
+          </a:p>
+          <a:p>
+            <a:r>
+              <a:rPr lang="en-US" altLang="zh-CN" dirty="0" smtClean="0"/>
+              <a:t>Parallelization on 24 Game solver with heuristic</a:t>
+            </a:r>
+            <a:endParaRPr lang="en-US" altLang="zh-CN" dirty="0"/>
           </a:p>
           <a:p>
             <a:endParaRPr lang="en-US" altLang="zh-CN" sz="3200" dirty="0">
@@ -3882,41 +3981,24 @@
         <p:spPr/>
         <p:txBody>
           <a:bodyPr>
-            <a:normAutofit fontScale="85000" lnSpcReduction="10000"/>
+            <a:normAutofit/>
           </a:bodyPr>
           <a:lstStyle/>
           <a:p>
-            <a:r>
-              <a:rPr lang="en-US" dirty="0"/>
-              <a:t>Provide a hypothesis for the parallelization strategy of your project</a:t>
-            </a:r>
-          </a:p>
-          <a:p>
-            <a:r>
-              <a:rPr lang="en-US" dirty="0"/>
-              <a:t>Hypothesis is a short one line summary of what you are claiming to be true in this project.</a:t>
-            </a:r>
-          </a:p>
-          <a:p>
+            <a:endParaRPr lang="en-US" dirty="0" smtClean="0"/>
+          </a:p>
+          <a:p>
+            <a:r>
+              <a:rPr lang="en-US" dirty="0" smtClean="0"/>
+              <a:t>Our heuristic will decrease the execution time by eliminating a large amount of permutations</a:t>
+            </a:r>
             <a:endParaRPr lang="en-US" dirty="0"/>
           </a:p>
           <a:p>
-            <a:r>
-              <a:rPr lang="en-US" dirty="0"/>
-              <a:t>E.g. Shared Memory in GPUs can be used to accelerate Matrix Multiplication by exploiting data reuse</a:t>
-            </a:r>
-          </a:p>
-          <a:p>
             <a:endParaRPr lang="en-US" dirty="0"/>
           </a:p>
           <a:p>
-            <a:r>
-              <a:rPr lang="en-US" dirty="0"/>
-              <a:t>E.g. Task parallelism is more suitable for algorithm xx than data parallelism due to the loop dependencies in the algorithm</a:t>
-            </a:r>
-          </a:p>
-          <a:p>
-            <a:endParaRPr lang="en-US" dirty="0"/>
+            <a:endParaRPr lang="en-US" dirty="0" smtClean="0"/>
           </a:p>
           <a:p>
             <a:endParaRPr lang="en-US" dirty="0"/>
@@ -3994,7 +4076,7 @@
         </p:nvSpPr>
         <p:spPr>
           <a:xfrm>
-            <a:off x="628650" y="1219200"/>
+            <a:off x="628650" y="990600"/>
             <a:ext cx="8362950" cy="4572001"/>
           </a:xfrm>
         </p:spPr>
@@ -4003,25 +4085,59 @@
           <a:lstStyle/>
           <a:p>
             <a:r>
-              <a:rPr lang="en-US" altLang="zh-CN" sz="3200" dirty="0"/>
-              <a:t>Explain the algorithm/solution identifying all the necessary parameters which can be tweaked to parallelize (e.g. parameters: number of threads, block size etc.)</a:t>
-            </a:r>
-          </a:p>
-          <a:p>
-            <a:r>
-              <a:rPr lang="en-US" altLang="zh-CN" sz="3200" dirty="0">
+              <a:rPr lang="en-US" altLang="zh-CN" sz="3200" dirty="0" smtClean="0"/>
+              <a:t>Parameters:</a:t>
+            </a:r>
+          </a:p>
+          <a:p>
+            <a:pPr lvl="1"/>
+            <a:r>
+              <a:rPr lang="en-US" altLang="zh-CN" dirty="0" smtClean="0"/>
+              <a:t>iterations</a:t>
+            </a:r>
+          </a:p>
+          <a:p>
+            <a:pPr lvl="1"/>
+            <a:r>
+              <a:rPr lang="en-US" altLang="zh-CN" dirty="0" err="1" smtClean="0"/>
+              <a:t>top_nums</a:t>
+            </a:r>
+            <a:endParaRPr lang="en-US" altLang="zh-CN" dirty="0" smtClean="0"/>
+          </a:p>
+          <a:p>
+            <a:pPr lvl="1"/>
+            <a:r>
+              <a:rPr lang="en-US" altLang="zh-CN" dirty="0" err="1" smtClean="0"/>
+              <a:t>num_threads</a:t>
+            </a:r>
+            <a:endParaRPr lang="en-US" altLang="zh-CN" dirty="0" smtClean="0"/>
+          </a:p>
+          <a:p>
+            <a:pPr lvl="1"/>
+            <a:endParaRPr lang="en-US" altLang="zh-CN" dirty="0"/>
+          </a:p>
+          <a:p>
+            <a:r>
+              <a:rPr lang="en-US" altLang="zh-CN" sz="3200" dirty="0" err="1" smtClean="0">
                 <a:ea typeface="宋体" charset="-122"/>
               </a:rPr>
-              <a:t>Mention the programming platform you are using and the reason for selecting it.</a:t>
-            </a:r>
-          </a:p>
-          <a:p>
-            <a:r>
-              <a:rPr lang="en-US" altLang="zh-CN" sz="3200" dirty="0">
+              <a:t>Pthreads</a:t>
+            </a:r>
+            <a:r>
+              <a:rPr lang="en-US" altLang="zh-CN" sz="3200" dirty="0" smtClean="0">
                 <a:ea typeface="宋体" charset="-122"/>
               </a:rPr>
-              <a:t>Focus only on issues relevant to EE 451.  All domain specific details should be given in intro/context slides. </a:t>
-            </a:r>
+              <a:t> algorithm divides the number of iterations by the number of threads so each thread is responsible for solving # of cards equal to iterations/</a:t>
+            </a:r>
+            <a:r>
+              <a:rPr lang="en-US" altLang="zh-CN" sz="3200" dirty="0" err="1" smtClean="0">
+                <a:ea typeface="宋体" charset="-122"/>
+              </a:rPr>
+              <a:t>num_threads</a:t>
+            </a:r>
+            <a:endParaRPr lang="en-US" altLang="zh-CN" sz="3200" dirty="0">
+              <a:ea typeface="宋体" charset="-122"/>
+            </a:endParaRPr>
           </a:p>
         </p:txBody>
       </p:sp>
@@ -4078,8 +4194,8 @@
           </a:p>
         </p:txBody>
       </p:sp>
-      <mc:AlternateContent xmlns:mc="http://schemas.openxmlformats.org/markup-compatibility/2006" xmlns:a14="http://schemas.microsoft.com/office/drawing/2010/main">
-        <mc:Choice Requires="a14">
+      <mc:AlternateContent xmlns:mc="http://schemas.openxmlformats.org/markup-compatibility/2006">
+        <mc:Choice xmlns:a14="http://schemas.microsoft.com/office/drawing/2010/main" Requires="a14">
           <p:sp>
             <p:nvSpPr>
               <p:cNvPr id="3" name="内容占位符 2"/>
@@ -4098,78 +4214,125 @@
             </p:spPr>
             <p:txBody>
               <a:bodyPr>
-                <a:normAutofit fontScale="92500" lnSpcReduction="10000"/>
+                <a:normAutofit fontScale="85000" lnSpcReduction="20000"/>
               </a:bodyPr>
               <a:lstStyle/>
               <a:p>
                 <a:r>
-                  <a:rPr lang="en-US" altLang="zh-CN" sz="3200" dirty="0"/>
-                  <a:t>Parameter 1</a:t>
+                  <a:rPr lang="en-US" altLang="zh-CN" sz="3200" i="1" dirty="0" smtClean="0"/>
+                  <a:t>iterations</a:t>
                 </a:r>
+                <a:endParaRPr lang="en-US" altLang="zh-CN" sz="3200" i="1" dirty="0"/>
               </a:p>
               <a:p>
                 <a:pPr lvl="1"/>
                 <a:r>
-                  <a:rPr lang="en-US" altLang="zh-CN" sz="3000" dirty="0">
+                  <a:rPr lang="en-US" altLang="zh-CN" sz="3000" dirty="0" smtClean="0">
                     <a:ea typeface="宋体" charset="-122"/>
                   </a:rPr>
-                  <a:t>Explain what it means</a:t>
+                  <a:t>Number of 24 Game cards to solve</a:t>
                 </a:r>
+                <a:endParaRPr lang="en-US" altLang="zh-CN" sz="3000" dirty="0">
+                  <a:ea typeface="宋体" charset="-122"/>
+                </a:endParaRPr>
               </a:p>
               <a:p>
                 <a:pPr lvl="1"/>
                 <a:r>
-                  <a:rPr lang="en-US" altLang="zh-CN" sz="3000" dirty="0">
+                  <a:rPr lang="en-US" altLang="zh-CN" sz="3000" dirty="0" smtClean="0">
                     <a:ea typeface="宋体" charset="-122"/>
                   </a:rPr>
-                  <a:t>Explain its expected effect on performance</a:t>
+                  <a:t>Increasing the number of </a:t>
                 </a:r>
+                <a:r>
+                  <a:rPr lang="en-US" altLang="zh-CN" sz="3000" i="1" dirty="0" smtClean="0">
+                    <a:ea typeface="宋体" charset="-122"/>
+                  </a:rPr>
+                  <a:t>iterations</a:t>
+                </a:r>
+                <a:r>
+                  <a:rPr lang="en-US" altLang="zh-CN" sz="3000" dirty="0" smtClean="0">
+                    <a:ea typeface="宋体" charset="-122"/>
+                  </a:rPr>
+                  <a:t> should make the heuristic more useful =&gt; reduce execution time</a:t>
+                </a:r>
+                <a:endParaRPr lang="en-US" altLang="zh-CN" sz="3000" dirty="0">
+                  <a:ea typeface="宋体" charset="-122"/>
+                </a:endParaRPr>
               </a:p>
               <a:p>
                 <a:r>
-                  <a:rPr lang="en-US" altLang="zh-CN" sz="3200" dirty="0">
+                  <a:rPr lang="en-US" altLang="zh-CN" sz="3200" i="1" dirty="0" err="1" smtClean="0">
                     <a:ea typeface="宋体" charset="-122"/>
                   </a:rPr>
-                  <a:t>Parameter 2</a:t>
+                  <a:t>t</a:t>
                 </a:r>
+                <a:r>
+                  <a:rPr lang="en-US" altLang="zh-CN" sz="3200" i="1" dirty="0" err="1" smtClean="0">
+                    <a:ea typeface="宋体" charset="-122"/>
+                  </a:rPr>
+                  <a:t>op_nums</a:t>
+                </a:r>
+                <a:endParaRPr lang="en-US" altLang="zh-CN" sz="3200" i="1" dirty="0">
+                  <a:ea typeface="宋体" charset="-122"/>
+                </a:endParaRPr>
               </a:p>
               <a:p>
                 <a:pPr lvl="1"/>
                 <a:r>
-                  <a:rPr lang="en-US" altLang="zh-CN" sz="3000" dirty="0">
+                  <a:rPr lang="en-US" altLang="zh-CN" sz="2800" dirty="0" smtClean="0">
                     <a:ea typeface="宋体" charset="-122"/>
                   </a:rPr>
-                  <a:t>…..</a:t>
+                  <a:t>Number of most frequent input numbers to run heuristic on</a:t>
                 </a:r>
+                <a:endParaRPr lang="en-US" altLang="zh-CN" sz="2800" dirty="0">
+                  <a:ea typeface="宋体" charset="-122"/>
+                </a:endParaRPr>
               </a:p>
               <a:p>
                 <a:pPr lvl="1"/>
                 <a:r>
-                  <a:rPr lang="en-US" altLang="zh-CN" sz="3000" dirty="0">
+                  <a:rPr lang="en-US" altLang="zh-CN" sz="3000" dirty="0" smtClean="0">
                     <a:ea typeface="宋体" charset="-122"/>
                   </a:rPr>
-                  <a:t>…..</a:t>
+                  <a:t>There will be an ideal number for </a:t>
                 </a:r>
+                <a:r>
+                  <a:rPr lang="en-US" altLang="zh-CN" sz="3000" i="1" dirty="0" err="1" smtClean="0">
+                    <a:ea typeface="宋体" charset="-122"/>
+                  </a:rPr>
+                  <a:t>top_nums</a:t>
+                </a:r>
+                <a:r>
+                  <a:rPr lang="en-US" altLang="zh-CN" sz="3000" dirty="0" smtClean="0">
+                    <a:ea typeface="宋体" charset="-122"/>
+                  </a:rPr>
+                  <a:t> that will make the heuristic most beneficial</a:t>
+                </a:r>
+                <a:endParaRPr lang="en-US" altLang="zh-CN" sz="3000" dirty="0">
+                  <a:ea typeface="宋体" charset="-122"/>
+                </a:endParaRPr>
               </a:p>
               <a:p>
                 <a:r>
-                  <a:rPr lang="en-US" altLang="zh-CN" sz="3200" dirty="0">
+                  <a:rPr lang="en-US" altLang="zh-CN" sz="3200" dirty="0" smtClean="0">
                     <a:ea typeface="宋体" charset="-122"/>
                   </a:rPr>
-                  <a:t>e.g. </a:t>
+                  <a:t> </a:t>
                 </a:r>
-                <a14:m>
-                  <m:oMath xmlns:m="http://schemas.openxmlformats.org/officeDocument/2006/math">
-                    <m:r>
-                      <a:rPr lang="en-US" altLang="zh-CN" sz="3200" b="0" i="1" dirty="0" smtClean="0">
-                        <a:latin typeface="Cambria Math" panose="02040503050406030204" pitchFamily="18" charset="0"/>
-                        <a:ea typeface="宋体" charset="-122"/>
-                      </a:rPr>
-                      <m:t>𝑝</m:t>
-                    </m:r>
-                  </m:oMath>
-                </a14:m>
-                <a:endParaRPr lang="en-US" altLang="zh-CN" sz="3200" dirty="0">
+                <a:r>
+                  <a:rPr lang="en-US" altLang="zh-CN" sz="3400" i="1" dirty="0" err="1" smtClean="0">
+                    <a:ea typeface="宋体" charset="-122"/>
+                  </a:rPr>
+                  <a:t>n</a:t>
+                </a:r>
+                <a:r>
+                  <a:rPr lang="en-US" altLang="zh-CN" sz="3400" i="1" dirty="0" err="1" smtClean="0">
+                    <a:ea typeface="宋体" charset="-122"/>
+                  </a:rPr>
+                  <a:t>um_threads</a:t>
+                </a:r>
+                <a:endParaRPr lang="en-US" altLang="zh-CN" sz="3400" i="1" dirty="0">
                   <a:ea typeface="宋体" charset="-122"/>
                 </a:endParaRPr>
               </a:p>
@@ -4194,18 +4357,38 @@
                   <m:oMath xmlns:m="http://schemas.openxmlformats.org/officeDocument/2006/math">
                     <m:r>
                       <a:rPr lang="en-US" altLang="zh-CN" sz="3000" b="0" i="1" smtClean="0">
-                        <a:latin typeface="Cambria Math" panose="02040503050406030204" pitchFamily="18" charset="0"/>
+                        <a:latin typeface="Cambria Math" charset="0"/>
                         <a:ea typeface="宋体" charset="-122"/>
                       </a:rPr>
-                      <m:t>𝑝</m:t>
+                      <m:t>𝑛𝑢𝑚</m:t>
+                    </m:r>
+                    <m:r>
+                      <a:rPr lang="en-US" altLang="zh-CN" sz="3000" b="0" i="1" smtClean="0">
+                        <a:latin typeface="Cambria Math" charset="0"/>
+                        <a:ea typeface="宋体" charset="-122"/>
+                      </a:rPr>
+                      <m:t>_</m:t>
+                    </m:r>
+                    <m:r>
+                      <a:rPr lang="en-US" altLang="zh-CN" sz="3000" b="0" i="1" smtClean="0">
+                        <a:latin typeface="Cambria Math" charset="0"/>
+                        <a:ea typeface="宋体" charset="-122"/>
+                      </a:rPr>
+                      <m:t>𝑡h𝑟𝑒𝑎𝑑𝑠</m:t>
                     </m:r>
                   </m:oMath>
                 </a14:m>
                 <a:r>
+                  <a:rPr lang="en-US" altLang="zh-CN" sz="3000" dirty="0" smtClean="0">
+                    <a:ea typeface="宋体" charset="-122"/>
+                  </a:rPr>
+                  <a:t> </a:t>
+                </a:r>
+                <a:r>
                   <a:rPr lang="en-US" altLang="zh-CN" sz="3000" dirty="0">
                     <a:ea typeface="宋体" charset="-122"/>
                   </a:rPr>
-                  <a:t> should reduce the execution time</a:t>
+                  <a:t>should reduce the execution time</a:t>
                 </a:r>
               </a:p>
               <a:p>
@@ -4217,7 +4400,7 @@
             </p:txBody>
           </p:sp>
         </mc:Choice>
-        <mc:Fallback xmlns="">
+        <mc:Fallback>
           <p:sp>
             <p:nvSpPr>
               <p:cNvPr id="3" name="内容占位符 2"/>
@@ -4233,10 +4416,10 @@
                 <a:off x="628650" y="1219200"/>
                 <a:ext cx="8362950" cy="4572001"/>
               </a:xfrm>
-              <a:blipFill>
+              <a:blipFill rotWithShape="0">
                 <a:blip r:embed="rId2"/>
                 <a:stretch>
-                  <a:fillRect l="-1458" t="-2667"/>
+                  <a:fillRect l="-1239" t="-2800" r="-802" b="-3600"/>
                 </a:stretch>
               </a:blipFill>
             </p:spPr>
@@ -4329,36 +4512,46 @@
           <a:lstStyle/>
           <a:p>
             <a:r>
-              <a:rPr lang="en-US" altLang="zh-CN" sz="3200" dirty="0"/>
-              <a:t>Explain the evaluation plan</a:t>
-            </a:r>
+              <a:rPr lang="en-US" altLang="zh-CN" sz="3200" dirty="0" smtClean="0"/>
+              <a:t>Approaches:</a:t>
+            </a:r>
+            <a:endParaRPr lang="en-US" altLang="zh-CN" sz="3200" dirty="0"/>
           </a:p>
           <a:p>
             <a:pPr lvl="1"/>
             <a:r>
-              <a:rPr lang="en-US" altLang="zh-CN" sz="3000" dirty="0">
+              <a:rPr lang="en-US" altLang="zh-CN" sz="3000" dirty="0" smtClean="0">
                 <a:ea typeface="宋体" charset="-122"/>
               </a:rPr>
-              <a:t>Platform</a:t>
-            </a:r>
+              <a:t>Naive</a:t>
+            </a:r>
+            <a:endParaRPr lang="en-US" altLang="zh-CN" sz="3000" dirty="0">
+              <a:ea typeface="宋体" charset="-122"/>
+            </a:endParaRPr>
           </a:p>
           <a:p>
             <a:pPr lvl="1"/>
             <a:r>
-              <a:rPr lang="en-US" altLang="zh-CN" sz="3000" dirty="0">
+              <a:rPr lang="en-US" altLang="zh-CN" sz="3000" dirty="0" err="1" smtClean="0">
                 <a:ea typeface="宋体" charset="-122"/>
               </a:rPr>
-              <a:t>Dataset used</a:t>
-            </a:r>
+              <a:t>Pthreads</a:t>
+            </a:r>
+            <a:endParaRPr lang="en-US" altLang="zh-CN" sz="3000" dirty="0">
+              <a:ea typeface="宋体" charset="-122"/>
+            </a:endParaRPr>
           </a:p>
           <a:p>
             <a:pPr lvl="1"/>
             <a:r>
-              <a:rPr lang="en-US" altLang="zh-CN" sz="3000" dirty="0">
+              <a:rPr lang="en-US" altLang="zh-CN" sz="3000" dirty="0" smtClean="0">
                 <a:ea typeface="宋体" charset="-122"/>
               </a:rPr>
-              <a:t>The range of the values of each parameters</a:t>
-            </a:r>
+              <a:t>Heuristic</a:t>
+            </a:r>
+            <a:endParaRPr lang="en-US" altLang="zh-CN" sz="3000" dirty="0">
+              <a:ea typeface="宋体" charset="-122"/>
+            </a:endParaRPr>
           </a:p>
         </p:txBody>
       </p:sp>

</xml_diff>